<commit_message>
Web app + openAI
Adding OpenAi to the webapp
</commit_message>
<xml_diff>
--- a/Car sales analysis and prediction.pptx
+++ b/Car sales analysis and prediction.pptx
@@ -234,7 +234,7 @@
             <a:pPr rtl="0"/>
             <a:fld id="{CDB1847A-0CC2-4008-8C1F-4CB2549424F0}" type="datetime1">
               <a:rPr lang="fr-FR" smtClean="0"/>
-              <a:t>03/02/2024</a:t>
+              <a:t>08/02/2024</a:t>
             </a:fld>
             <a:endParaRPr lang="fr-FR"/>
           </a:p>
@@ -416,7 +416,7 @@
             <a:pPr rtl="0"/>
             <a:fld id="{83ED5736-AEC1-4353-A59E-C1D97F8135E3}" type="datetime1">
               <a:rPr lang="fr-FR" noProof="0" smtClean="0"/>
-              <a:t>03/02/2024</a:t>
+              <a:t>08/02/2024</a:t>
             </a:fld>
             <a:endParaRPr lang="fr-FR" noProof="0"/>
           </a:p>
@@ -7482,8 +7482,8 @@
         </p:nvSpPr>
         <p:spPr>
           <a:xfrm>
-            <a:off x="646111" y="1853248"/>
-            <a:ext cx="8946541" cy="4195481"/>
+            <a:off x="646111" y="1853249"/>
+            <a:ext cx="8946541" cy="1963378"/>
           </a:xfrm>
         </p:spPr>
         <p:txBody>
@@ -7498,7 +7498,7 @@
           <a:p>
             <a:r>
               <a:rPr lang="en-US" dirty="0"/>
-              <a:t>Creating an app that can be easily used by a lambda user</a:t>
+              <a:t>Creating an app that can be easily used by a client</a:t>
             </a:r>
           </a:p>
           <a:p>
@@ -7693,6 +7693,12 @@
           <a:p>
             <a:r>
               <a:rPr lang="en-US" dirty="0"/>
+              <a:t>Categorical to Numerical</a:t>
+            </a:r>
+          </a:p>
+          <a:p>
+            <a:r>
+              <a:rPr lang="en-US" dirty="0"/>
               <a:t>Target encoding</a:t>
             </a:r>
           </a:p>
@@ -7710,18 +7716,14 @@
           </a:p>
           <a:p>
             <a:r>
-              <a:rPr lang="en-US" dirty="0" err="1"/>
-              <a:t>Biais</a:t>
-            </a:r>
-            <a:r>
               <a:rPr lang="en-US" dirty="0"/>
-              <a:t>?</a:t>
+              <a:t>Score 0,78</a:t>
             </a:r>
           </a:p>
           <a:p>
             <a:r>
               <a:rPr lang="en-US" dirty="0"/>
-              <a:t>0,78</a:t>
+              <a:t>MAE 3100</a:t>
             </a:r>
           </a:p>
           <a:p>
@@ -7751,8 +7753,8 @@
         </p:blipFill>
         <p:spPr>
           <a:xfrm>
-            <a:off x="6257925" y="2724150"/>
-            <a:ext cx="5934075" cy="4133850"/>
+            <a:off x="5367131" y="2103596"/>
+            <a:ext cx="6824870" cy="4754404"/>
           </a:xfrm>
           <a:prstGeom prst="rect">
             <a:avLst/>
@@ -7980,8 +7982,13 @@
           <a:p>
             <a:r>
               <a:rPr lang="en-US" dirty="0"/>
-              <a:t>Features relation for Machine learning</a:t>
-            </a:r>
+              <a:t>Features </a:t>
+            </a:r>
+            <a:r>
+              <a:rPr lang="en-US" dirty="0" err="1"/>
+              <a:t>realtionship</a:t>
+            </a:r>
+            <a:endParaRPr lang="en-US" dirty="0"/>
           </a:p>
           <a:p>
             <a:r>
@@ -8000,7 +8007,7 @@
             </a:r>
             <a:r>
               <a:rPr lang="en-US" dirty="0"/>
-              <a:t>/code</a:t>
+              <a:t> / code</a:t>
             </a:r>
           </a:p>
           <a:p>
@@ -9197,15 +9204,6 @@
 </file>
 
 <file path=customXml/item1.xml><?xml version="1.0" encoding="utf-8"?>
-<p:properties xmlns:p="http://schemas.microsoft.com/office/2006/metadata/properties" xmlns:xsi="http://www.w3.org/2001/XMLSchema-instance" xmlns:pc="http://schemas.microsoft.com/office/infopath/2007/PartnerControls">
-  <documentManagement>
-    <Status xmlns="71af3243-3dd4-4a8d-8c0d-dd76da1f02a5">Not started</Status>
-    <MediaServiceKeyPoints xmlns="71af3243-3dd4-4a8d-8c0d-dd76da1f02a5" xsi:nil="true"/>
-  </documentManagement>
-</p:properties>
-</file>
-
-<file path=customXml/item2.xml><?xml version="1.0" encoding="utf-8"?>
 <ct:contentTypeSchema xmlns:ct="http://schemas.microsoft.com/office/2006/metadata/contentType" xmlns:ma="http://schemas.microsoft.com/office/2006/metadata/properties/metaAttributes" ct:_="" ma:_="" ma:contentTypeName="Document" ma:contentTypeID="0x01010079F111ED35F8CC479449609E8A0923A6" ma:contentTypeVersion="12" ma:contentTypeDescription="Create a new document." ma:contentTypeScope="" ma:versionID="93813dd7ca6ad654711aa0ab317e03a3">
   <xsd:schema xmlns:xsd="http://www.w3.org/2001/XMLSchema" xmlns:xs="http://www.w3.org/2001/XMLSchema" xmlns:p="http://schemas.microsoft.com/office/2006/metadata/properties" xmlns:ns2="71af3243-3dd4-4a8d-8c0d-dd76da1f02a5" xmlns:ns3="16c05727-aa75-4e4a-9b5f-8a80a1165891" targetNamespace="http://schemas.microsoft.com/office/2006/metadata/properties" ma:root="true" ma:fieldsID="f11dc0ce689dd3925e84e4e35398c6e7" ns2:_="" ns3:_="">
     <xsd:import namespace="71af3243-3dd4-4a8d-8c0d-dd76da1f02a5"/>
@@ -9426,6 +9424,15 @@
 </ct:contentTypeSchema>
 </file>
 
+<file path=customXml/item2.xml><?xml version="1.0" encoding="utf-8"?>
+<p:properties xmlns:p="http://schemas.microsoft.com/office/2006/metadata/properties" xmlns:xsi="http://www.w3.org/2001/XMLSchema-instance" xmlns:pc="http://schemas.microsoft.com/office/infopath/2007/PartnerControls">
+  <documentManagement>
+    <Status xmlns="71af3243-3dd4-4a8d-8c0d-dd76da1f02a5">Not started</Status>
+    <MediaServiceKeyPoints xmlns="71af3243-3dd4-4a8d-8c0d-dd76da1f02a5" xsi:nil="true"/>
+  </documentManagement>
+</p:properties>
+</file>
+
 <file path=customXml/item3.xml><?xml version="1.0" encoding="utf-8"?>
 <?mso-contentType ?>
 <FormTemplates xmlns="http://schemas.microsoft.com/sharepoint/v3/contenttype/forms">
@@ -9436,16 +9443,6 @@
 </file>
 
 <file path=customXml/itemProps1.xml><?xml version="1.0" encoding="utf-8"?>
-<ds:datastoreItem xmlns:ds="http://schemas.openxmlformats.org/officeDocument/2006/customXml" ds:itemID="{048C88F1-1664-415F-AFCE-F6CF45809817}">
-  <ds:schemaRefs>
-    <ds:schemaRef ds:uri="http://schemas.microsoft.com/office/2006/metadata/properties"/>
-    <ds:schemaRef ds:uri="http://schemas.microsoft.com/office/infopath/2007/PartnerControls"/>
-    <ds:schemaRef ds:uri="71af3243-3dd4-4a8d-8c0d-dd76da1f02a5"/>
-  </ds:schemaRefs>
-</ds:datastoreItem>
-</file>
-
-<file path=customXml/itemProps2.xml><?xml version="1.0" encoding="utf-8"?>
 <ds:datastoreItem xmlns:ds="http://schemas.openxmlformats.org/officeDocument/2006/customXml" ds:itemID="{CC30393A-FEC6-4A44-9E4A-6EA49F1F7DC0}">
   <ds:schemaRefs>
     <ds:schemaRef ds:uri="http://schemas.microsoft.com/office/2006/metadata/contentType"/>
@@ -9464,6 +9461,16 @@
 </ds:datastoreItem>
 </file>
 
+<file path=customXml/itemProps2.xml><?xml version="1.0" encoding="utf-8"?>
+<ds:datastoreItem xmlns:ds="http://schemas.openxmlformats.org/officeDocument/2006/customXml" ds:itemID="{048C88F1-1664-415F-AFCE-F6CF45809817}">
+  <ds:schemaRefs>
+    <ds:schemaRef ds:uri="http://schemas.microsoft.com/office/2006/metadata/properties"/>
+    <ds:schemaRef ds:uri="http://schemas.microsoft.com/office/infopath/2007/PartnerControls"/>
+    <ds:schemaRef ds:uri="71af3243-3dd4-4a8d-8c0d-dd76da1f02a5"/>
+  </ds:schemaRefs>
+</ds:datastoreItem>
+</file>
+
 <file path=customXml/itemProps3.xml><?xml version="1.0" encoding="utf-8"?>
 <ds:datastoreItem xmlns:ds="http://schemas.openxmlformats.org/officeDocument/2006/customXml" ds:itemID="{0D16958A-754B-4396-9457-FD7A427A37DD}">
   <ds:schemaRefs>

</xml_diff>

<commit_message>
Fixing minor issues in the web app
</commit_message>
<xml_diff>
--- a/Car sales analysis and prediction.pptx
+++ b/Car sales analysis and prediction.pptx
@@ -234,7 +234,7 @@
             <a:pPr rtl="0"/>
             <a:fld id="{CDB1847A-0CC2-4008-8C1F-4CB2549424F0}" type="datetime1">
               <a:rPr lang="fr-FR" smtClean="0"/>
-              <a:t>08/02/2024</a:t>
+              <a:t>09/02/2024</a:t>
             </a:fld>
             <a:endParaRPr lang="fr-FR"/>
           </a:p>
@@ -416,7 +416,7 @@
             <a:pPr rtl="0"/>
             <a:fld id="{83ED5736-AEC1-4353-A59E-C1D97F8135E3}" type="datetime1">
               <a:rPr lang="fr-FR" noProof="0" smtClean="0"/>
-              <a:t>08/02/2024</a:t>
+              <a:t>09/02/2024</a:t>
             </a:fld>
             <a:endParaRPr lang="fr-FR" noProof="0"/>
           </a:p>
@@ -7483,28 +7483,36 @@
         <p:spPr>
           <a:xfrm>
             <a:off x="646111" y="1853249"/>
-            <a:ext cx="8946541" cy="1963378"/>
+            <a:ext cx="10108575" cy="1963378"/>
           </a:xfrm>
         </p:spPr>
         <p:txBody>
-          <a:bodyPr/>
+          <a:bodyPr>
+            <a:normAutofit fontScale="92500" lnSpcReduction="10000"/>
+          </a:bodyPr>
           <a:lstStyle/>
           <a:p>
             <a:r>
               <a:rPr lang="en-US" dirty="0"/>
-              <a:t>Solving a business problem</a:t>
+              <a:t>Helping a private vendor to estimate his car or a car dealer to follow his statistics,</a:t>
             </a:r>
           </a:p>
           <a:p>
             <a:r>
               <a:rPr lang="en-US" dirty="0"/>
-              <a:t>Creating an app that can be easily used by a client</a:t>
+              <a:t>Solving a business problem,</a:t>
             </a:r>
           </a:p>
           <a:p>
             <a:r>
               <a:rPr lang="en-US" dirty="0"/>
-              <a:t>Linked to a database and can be updated</a:t>
+              <a:t>Creating an app that can be easily used by a client,</a:t>
+            </a:r>
+          </a:p>
+          <a:p>
+            <a:r>
+              <a:rPr lang="en-US" dirty="0"/>
+              <a:t>Linked to a database and can be updated,</a:t>
             </a:r>
           </a:p>
           <a:p>
@@ -7518,7 +7526,7 @@
             </a:r>
             <a:r>
               <a:rPr lang="en-US" dirty="0"/>
-              <a:t> to SQL to Machine learning</a:t>
+              <a:t> to SQL to Machine learning.</a:t>
             </a:r>
           </a:p>
           <a:p>
@@ -7673,7 +7681,7 @@
           <a:p>
             <a:r>
               <a:rPr lang="en-US" dirty="0"/>
-              <a:t>180 000km to 180000</a:t>
+              <a:t>180 000km to 180000,</a:t>
             </a:r>
           </a:p>
           <a:p>
@@ -7687,43 +7695,43 @@
             </a:r>
             <a:r>
               <a:rPr lang="en-US" dirty="0"/>
-              <a:t> to Audi A3</a:t>
+              <a:t> to Audi A3,</a:t>
             </a:r>
           </a:p>
           <a:p>
             <a:r>
               <a:rPr lang="en-US" dirty="0"/>
-              <a:t>Categorical to Numerical</a:t>
+              <a:t>Categorical to Numerical,</a:t>
             </a:r>
           </a:p>
           <a:p>
             <a:r>
               <a:rPr lang="en-US" dirty="0"/>
-              <a:t>Target encoding</a:t>
+              <a:t>Target encoding,</a:t>
             </a:r>
           </a:p>
           <a:p>
             <a:r>
               <a:rPr lang="en-US" dirty="0"/>
-              <a:t>Feature encoding</a:t>
+              <a:t>Feature encoding,</a:t>
             </a:r>
           </a:p>
           <a:p>
             <a:r>
               <a:rPr lang="en-US" dirty="0"/>
-              <a:t>Binning</a:t>
+              <a:t>Binning,</a:t>
             </a:r>
           </a:p>
           <a:p>
             <a:r>
               <a:rPr lang="en-US" dirty="0"/>
-              <a:t>Score 0,78</a:t>
+              <a:t>Score 0,78 – Extra Tree Regressor,</a:t>
             </a:r>
           </a:p>
           <a:p>
             <a:r>
               <a:rPr lang="en-US" dirty="0"/>
-              <a:t>MAE 3100</a:t>
+              <a:t>MAE 3100$.</a:t>
             </a:r>
           </a:p>
           <a:p>
@@ -7982,44 +7990,35 @@
           <a:p>
             <a:r>
               <a:rPr lang="en-US" dirty="0"/>
-              <a:t>Features </a:t>
-            </a:r>
-            <a:r>
-              <a:rPr lang="en-US" dirty="0" err="1"/>
-              <a:t>realtionship</a:t>
-            </a:r>
-            <a:endParaRPr lang="en-US" dirty="0"/>
+              <a:t>Features relationships,</a:t>
+            </a:r>
           </a:p>
           <a:p>
             <a:r>
               <a:rPr lang="en-US" dirty="0"/>
-              <a:t>Machine learning engineering</a:t>
+              <a:t>Machine learning engineering,</a:t>
             </a:r>
           </a:p>
           <a:p>
             <a:r>
               <a:rPr lang="en-US" dirty="0"/>
-              <a:t>Structuring the </a:t>
-            </a:r>
-            <a:r>
-              <a:rPr lang="en-US" dirty="0" err="1"/>
-              <a:t>reflexion</a:t>
-            </a:r>
+              <a:t>Structuring the research process / code,</a:t>
+            </a:r>
+          </a:p>
+          <a:p>
             <a:r>
               <a:rPr lang="en-US" dirty="0"/>
-              <a:t> / code</a:t>
-            </a:r>
-          </a:p>
-          <a:p>
+              <a:t>Deploying the app,</a:t>
+            </a:r>
+          </a:p>
+          <a:p>
+            <a:r>
+              <a:rPr lang="en-US"/>
+              <a:t>Challenging myself</a:t>
+            </a:r>
             <a:r>
               <a:rPr lang="en-US" dirty="0"/>
-              <a:t>Changing the dataset mid way</a:t>
-            </a:r>
-          </a:p>
-          <a:p>
-            <a:r>
-              <a:rPr lang="en-US" dirty="0"/>
-              <a:t>Challenging myself</a:t>
+              <a:t>.</a:t>
             </a:r>
           </a:p>
         </p:txBody>
@@ -8170,64 +8169,15 @@
         </p:spPr>
         <p:txBody>
           <a:bodyPr rtlCol="0">
-            <a:normAutofit fontScale="90000"/>
+            <a:normAutofit/>
           </a:bodyPr>
           <a:lstStyle/>
           <a:p>
             <a:pPr rtl="0"/>
             <a:r>
-              <a:rPr lang="fr-FR" dirty="0" err="1"/>
-              <a:t>Special</a:t>
-            </a:r>
-            <a:r>
               <a:rPr lang="fr-FR" dirty="0"/>
-              <a:t> MERCI to all of </a:t>
-            </a:r>
-            <a:r>
-              <a:rPr lang="fr-FR" dirty="0" err="1"/>
-              <a:t>you</a:t>
-            </a:r>
-            <a:r>
-              <a:rPr lang="fr-FR" dirty="0"/>
-              <a:t> for </a:t>
-            </a:r>
-            <a:r>
-              <a:rPr lang="fr-FR" dirty="0" err="1"/>
-              <a:t>being</a:t>
-            </a:r>
-            <a:r>
-              <a:rPr lang="fr-FR" dirty="0"/>
-              <a:t> </a:t>
-            </a:r>
-            <a:r>
-              <a:rPr lang="fr-FR" dirty="0" err="1"/>
-              <a:t>great</a:t>
-            </a:r>
-            <a:r>
-              <a:rPr lang="fr-FR" dirty="0"/>
-              <a:t> </a:t>
-            </a:r>
-            <a:r>
-              <a:rPr lang="fr-FR" dirty="0" err="1"/>
-              <a:t>teachers</a:t>
-            </a:r>
-            <a:r>
-              <a:rPr lang="fr-FR" dirty="0"/>
-              <a:t> and </a:t>
-            </a:r>
-            <a:r>
-              <a:rPr lang="fr-FR" dirty="0" err="1"/>
-              <a:t>awsome</a:t>
-            </a:r>
-            <a:r>
-              <a:rPr lang="fr-FR" dirty="0"/>
-              <a:t> </a:t>
-            </a:r>
-            <a:r>
-              <a:rPr lang="fr-FR" dirty="0" err="1"/>
-              <a:t>classmates</a:t>
-            </a:r>
-            <a:endParaRPr lang="fr-FR" dirty="0"/>
+              <a:t>THANK YOU</a:t>
+            </a:r>
           </a:p>
         </p:txBody>
       </p:sp>
@@ -8262,15 +8212,7 @@
             <a:pPr rtl="0"/>
             <a:r>
               <a:rPr lang="fr-FR" dirty="0"/>
-              <a:t>Questions? </a:t>
-            </a:r>
-            <a:r>
-              <a:rPr lang="fr-FR" dirty="0" err="1"/>
-              <a:t>Really</a:t>
-            </a:r>
-            <a:r>
-              <a:rPr lang="fr-FR" dirty="0"/>
-              <a:t>?</a:t>
+              <a:t>Questions?</a:t>
             </a:r>
           </a:p>
         </p:txBody>
@@ -9204,6 +9146,15 @@
 </file>
 
 <file path=customXml/item1.xml><?xml version="1.0" encoding="utf-8"?>
+<p:properties xmlns:p="http://schemas.microsoft.com/office/2006/metadata/properties" xmlns:xsi="http://www.w3.org/2001/XMLSchema-instance" xmlns:pc="http://schemas.microsoft.com/office/infopath/2007/PartnerControls">
+  <documentManagement>
+    <Status xmlns="71af3243-3dd4-4a8d-8c0d-dd76da1f02a5">Not started</Status>
+    <MediaServiceKeyPoints xmlns="71af3243-3dd4-4a8d-8c0d-dd76da1f02a5" xsi:nil="true"/>
+  </documentManagement>
+</p:properties>
+</file>
+
+<file path=customXml/item2.xml><?xml version="1.0" encoding="utf-8"?>
 <ct:contentTypeSchema xmlns:ct="http://schemas.microsoft.com/office/2006/metadata/contentType" xmlns:ma="http://schemas.microsoft.com/office/2006/metadata/properties/metaAttributes" ct:_="" ma:_="" ma:contentTypeName="Document" ma:contentTypeID="0x01010079F111ED35F8CC479449609E8A0923A6" ma:contentTypeVersion="12" ma:contentTypeDescription="Create a new document." ma:contentTypeScope="" ma:versionID="93813dd7ca6ad654711aa0ab317e03a3">
   <xsd:schema xmlns:xsd="http://www.w3.org/2001/XMLSchema" xmlns:xs="http://www.w3.org/2001/XMLSchema" xmlns:p="http://schemas.microsoft.com/office/2006/metadata/properties" xmlns:ns2="71af3243-3dd4-4a8d-8c0d-dd76da1f02a5" xmlns:ns3="16c05727-aa75-4e4a-9b5f-8a80a1165891" targetNamespace="http://schemas.microsoft.com/office/2006/metadata/properties" ma:root="true" ma:fieldsID="f11dc0ce689dd3925e84e4e35398c6e7" ns2:_="" ns3:_="">
     <xsd:import namespace="71af3243-3dd4-4a8d-8c0d-dd76da1f02a5"/>
@@ -9424,15 +9375,6 @@
 </ct:contentTypeSchema>
 </file>
 
-<file path=customXml/item2.xml><?xml version="1.0" encoding="utf-8"?>
-<p:properties xmlns:p="http://schemas.microsoft.com/office/2006/metadata/properties" xmlns:xsi="http://www.w3.org/2001/XMLSchema-instance" xmlns:pc="http://schemas.microsoft.com/office/infopath/2007/PartnerControls">
-  <documentManagement>
-    <Status xmlns="71af3243-3dd4-4a8d-8c0d-dd76da1f02a5">Not started</Status>
-    <MediaServiceKeyPoints xmlns="71af3243-3dd4-4a8d-8c0d-dd76da1f02a5" xsi:nil="true"/>
-  </documentManagement>
-</p:properties>
-</file>
-
 <file path=customXml/item3.xml><?xml version="1.0" encoding="utf-8"?>
 <?mso-contentType ?>
 <FormTemplates xmlns="http://schemas.microsoft.com/sharepoint/v3/contenttype/forms">
@@ -9443,6 +9385,16 @@
 </file>
 
 <file path=customXml/itemProps1.xml><?xml version="1.0" encoding="utf-8"?>
+<ds:datastoreItem xmlns:ds="http://schemas.openxmlformats.org/officeDocument/2006/customXml" ds:itemID="{048C88F1-1664-415F-AFCE-F6CF45809817}">
+  <ds:schemaRefs>
+    <ds:schemaRef ds:uri="http://schemas.microsoft.com/office/2006/metadata/properties"/>
+    <ds:schemaRef ds:uri="http://schemas.microsoft.com/office/infopath/2007/PartnerControls"/>
+    <ds:schemaRef ds:uri="71af3243-3dd4-4a8d-8c0d-dd76da1f02a5"/>
+  </ds:schemaRefs>
+</ds:datastoreItem>
+</file>
+
+<file path=customXml/itemProps2.xml><?xml version="1.0" encoding="utf-8"?>
 <ds:datastoreItem xmlns:ds="http://schemas.openxmlformats.org/officeDocument/2006/customXml" ds:itemID="{CC30393A-FEC6-4A44-9E4A-6EA49F1F7DC0}">
   <ds:schemaRefs>
     <ds:schemaRef ds:uri="http://schemas.microsoft.com/office/2006/metadata/contentType"/>
@@ -9461,16 +9413,6 @@
 </ds:datastoreItem>
 </file>
 
-<file path=customXml/itemProps2.xml><?xml version="1.0" encoding="utf-8"?>
-<ds:datastoreItem xmlns:ds="http://schemas.openxmlformats.org/officeDocument/2006/customXml" ds:itemID="{048C88F1-1664-415F-AFCE-F6CF45809817}">
-  <ds:schemaRefs>
-    <ds:schemaRef ds:uri="http://schemas.microsoft.com/office/2006/metadata/properties"/>
-    <ds:schemaRef ds:uri="http://schemas.microsoft.com/office/infopath/2007/PartnerControls"/>
-    <ds:schemaRef ds:uri="71af3243-3dd4-4a8d-8c0d-dd76da1f02a5"/>
-  </ds:schemaRefs>
-</ds:datastoreItem>
-</file>
-
 <file path=customXml/itemProps3.xml><?xml version="1.0" encoding="utf-8"?>
 <ds:datastoreItem xmlns:ds="http://schemas.openxmlformats.org/officeDocument/2006/customXml" ds:itemID="{0D16958A-754B-4396-9457-FD7A427A37DD}">
   <ds:schemaRefs>

</xml_diff>